<commit_message>
Updated slides and deployment script
</commit_message>
<xml_diff>
--- a/Slides/Serverless vs Containers.pptx
+++ b/Slides/Serverless vs Containers.pptx
@@ -5,31 +5,33 @@
     <p:sldMasterId id="2147484671" r:id="rId4"/>
   </p:sldMasterIdLst>
   <p:notesMasterIdLst>
-    <p:notesMasterId r:id="rId24"/>
+    <p:notesMasterId r:id="rId26"/>
   </p:notesMasterIdLst>
   <p:handoutMasterIdLst>
-    <p:handoutMasterId r:id="rId25"/>
+    <p:handoutMasterId r:id="rId27"/>
   </p:handoutMasterIdLst>
   <p:sldIdLst>
     <p:sldId id="1861" r:id="rId5"/>
-    <p:sldId id="1865" r:id="rId6"/>
-    <p:sldId id="292" r:id="rId7"/>
-    <p:sldId id="263" r:id="rId8"/>
-    <p:sldId id="281" r:id="rId9"/>
-    <p:sldId id="1885" r:id="rId10"/>
-    <p:sldId id="1883" r:id="rId11"/>
-    <p:sldId id="1884" r:id="rId12"/>
-    <p:sldId id="266" r:id="rId13"/>
-    <p:sldId id="285" r:id="rId14"/>
-    <p:sldId id="1887" r:id="rId15"/>
-    <p:sldId id="1886" r:id="rId16"/>
-    <p:sldId id="1863" r:id="rId17"/>
-    <p:sldId id="1888" r:id="rId18"/>
-    <p:sldId id="1862" r:id="rId19"/>
-    <p:sldId id="1864" r:id="rId20"/>
-    <p:sldId id="1866" r:id="rId21"/>
-    <p:sldId id="1867" r:id="rId22"/>
-    <p:sldId id="1532" r:id="rId23"/>
+    <p:sldId id="1889" r:id="rId6"/>
+    <p:sldId id="1865" r:id="rId7"/>
+    <p:sldId id="292" r:id="rId8"/>
+    <p:sldId id="263" r:id="rId9"/>
+    <p:sldId id="281" r:id="rId10"/>
+    <p:sldId id="1885" r:id="rId11"/>
+    <p:sldId id="1883" r:id="rId12"/>
+    <p:sldId id="1884" r:id="rId13"/>
+    <p:sldId id="266" r:id="rId14"/>
+    <p:sldId id="285" r:id="rId15"/>
+    <p:sldId id="1887" r:id="rId16"/>
+    <p:sldId id="1886" r:id="rId17"/>
+    <p:sldId id="1863" r:id="rId18"/>
+    <p:sldId id="1888" r:id="rId19"/>
+    <p:sldId id="1862" r:id="rId20"/>
+    <p:sldId id="1864" r:id="rId21"/>
+    <p:sldId id="1866" r:id="rId22"/>
+    <p:sldId id="1867" r:id="rId23"/>
+    <p:sldId id="1890" r:id="rId24"/>
+    <p:sldId id="1532" r:id="rId25"/>
   </p:sldIdLst>
   <p:sldSz cx="12192000" cy="6858000"/>
   <p:notesSz cx="6858000" cy="9144000"/>
@@ -134,6 +136,7 @@
         <p14:section name="Microsoft Ignite Template" id="{888AB95E-1B7E-4E95-8F39-C5D0E8372BC2}">
           <p14:sldIdLst>
             <p14:sldId id="1861"/>
+            <p14:sldId id="1889"/>
             <p14:sldId id="1865"/>
             <p14:sldId id="292"/>
             <p14:sldId id="263"/>
@@ -151,6 +154,7 @@
             <p14:sldId id="1864"/>
             <p14:sldId id="1866"/>
             <p14:sldId id="1867"/>
+            <p14:sldId id="1890"/>
             <p14:sldId id="1532"/>
           </p14:sldIdLst>
         </p14:section>
@@ -734,7 +738,7 @@
               <a:rPr lang="en-US" smtClean="0">
                 <a:latin typeface="Segoe UI" pitchFamily="34" charset="0"/>
               </a:rPr>
-              <a:t>8/3/2019 8:57 PM</a:t>
+              <a:t>8/7/2019 8:19 PM</a:t>
             </a:fld>
             <a:endParaRPr lang="en-US" dirty="0">
               <a:latin typeface="Segoe UI" pitchFamily="34" charset="0"/>
@@ -1012,7 +1016,7 @@
           <a:p>
             <a:fld id="{386CE63F-9E7F-4C04-9D0D-FCA25A8E9E86}" type="datetime8">
               <a:rPr lang="en-US" smtClean="0"/>
-              <a:t>8/3/2019 8:57 PM</a:t>
+              <a:t>8/7/2019 8:18 PM</a:t>
             </a:fld>
             <a:endParaRPr lang="en-US" dirty="0"/>
           </a:p>
@@ -1459,7 +1463,7 @@
                 <a:tabLst/>
                 <a:defRPr/>
               </a:pPr>
-              <a:t>8/3/2019 8:57 PM</a:t>
+              <a:t>8/7/2019 8:18 PM</a:t>
             </a:fld>
             <a:endParaRPr kumimoji="0" lang="en-US" sz="1200" b="0" i="0" u="none" strike="noStrike" kern="1200" cap="none" spc="0" normalizeH="0" baseline="0" noProof="0">
               <a:ln>
@@ -1842,7 +1846,7 @@
                 <a:tabLst/>
                 <a:defRPr/>
               </a:pPr>
-              <a:t>8/3/2019 8:57 PM</a:t>
+              <a:t>8/7/2019 8:18 PM</a:t>
             </a:fld>
             <a:endParaRPr kumimoji="0" lang="en-US" sz="1200" b="0" i="0" u="none" strike="noStrike" kern="1200" cap="none" spc="0" normalizeH="0" baseline="0" noProof="0" dirty="0">
               <a:ln>
@@ -1925,7 +1929,7 @@
                 <a:tabLst/>
                 <a:defRPr/>
               </a:pPr>
-              <a:t>12</a:t>
+              <a:t>13</a:t>
             </a:fld>
             <a:endParaRPr kumimoji="0" lang="en-US" sz="1200" b="0" i="0" u="none" strike="noStrike" kern="1200" cap="none" spc="0" normalizeH="0" baseline="0" noProof="0" dirty="0">
               <a:ln>
@@ -2095,7 +2099,7 @@
           <a:p>
             <a:fld id="{386CE63F-9E7F-4C04-9D0D-FCA25A8E9E86}" type="datetime8">
               <a:rPr lang="en-US" smtClean="0"/>
-              <a:t>8/3/2019 8:57 PM</a:t>
+              <a:t>8/7/2019 8:18 PM</a:t>
             </a:fld>
             <a:endParaRPr lang="en-US" dirty="0"/>
           </a:p>
@@ -2119,7 +2123,7 @@
             <a:fld id="{B4008EB6-D09E-4580-8CD6-DDB14511944F}" type="slidenum">
               <a:rPr lang="en-US" smtClean="0"/>
               <a:pPr/>
-              <a:t>17</a:t>
+              <a:t>18</a:t>
             </a:fld>
             <a:endParaRPr lang="en-US" dirty="0"/>
           </a:p>
@@ -2276,7 +2280,7 @@
           <a:p>
             <a:fld id="{386CE63F-9E7F-4C04-9D0D-FCA25A8E9E86}" type="datetime8">
               <a:rPr lang="en-US" smtClean="0"/>
-              <a:t>8/3/2019 8:57 PM</a:t>
+              <a:t>8/7/2019 8:18 PM</a:t>
             </a:fld>
             <a:endParaRPr lang="en-US" dirty="0"/>
           </a:p>
@@ -2300,7 +2304,7 @@
             <a:fld id="{B4008EB6-D09E-4580-8CD6-DDB14511944F}" type="slidenum">
               <a:rPr lang="en-US" smtClean="0"/>
               <a:pPr/>
-              <a:t>18</a:t>
+              <a:t>19</a:t>
             </a:fld>
             <a:endParaRPr lang="en-US" dirty="0"/>
           </a:p>
@@ -2495,7 +2499,7 @@
                 <a:tabLst/>
                 <a:defRPr/>
               </a:pPr>
-              <a:t>8/3/2019 8:57 PM</a:t>
+              <a:t>8/7/2019 8:18 PM</a:t>
             </a:fld>
             <a:endParaRPr kumimoji="0" lang="en-US" sz="1200" b="0" i="0" u="none" strike="noStrike" kern="1200" cap="none" spc="0" normalizeH="0" baseline="0" noProof="0" dirty="0">
               <a:ln>
@@ -2578,7 +2582,7 @@
                 <a:tabLst/>
                 <a:defRPr/>
               </a:pPr>
-              <a:t>19</a:t>
+              <a:t>21</a:t>
             </a:fld>
             <a:endParaRPr kumimoji="0" lang="en-US" sz="1200" b="0" i="0" u="none" strike="noStrike" kern="1200" cap="none" spc="0" normalizeH="0" baseline="0" noProof="0" dirty="0">
               <a:ln>
@@ -2808,7 +2812,7 @@
           <a:p>
             <a:fld id="{386CE63F-9E7F-4C04-9D0D-FCA25A8E9E86}" type="datetime8">
               <a:rPr lang="en-US" smtClean="0"/>
-              <a:t>8/3/2019 8:57 PM</a:t>
+              <a:t>8/7/2019 8:18 PM</a:t>
             </a:fld>
             <a:endParaRPr lang="en-US" dirty="0"/>
           </a:p>
@@ -2832,7 +2836,7 @@
             <a:fld id="{B4008EB6-D09E-4580-8CD6-DDB14511944F}" type="slidenum">
               <a:rPr lang="en-US" smtClean="0"/>
               <a:pPr/>
-              <a:t>2</a:t>
+              <a:t>3</a:t>
             </a:fld>
             <a:endParaRPr lang="en-US" dirty="0"/>
           </a:p>
@@ -3034,7 +3038,7 @@
           <a:p>
             <a:fld id="{386CE63F-9E7F-4C04-9D0D-FCA25A8E9E86}" type="datetime8">
               <a:rPr lang="en-US" smtClean="0"/>
-              <a:t>8/3/2019 8:57 PM</a:t>
+              <a:t>8/7/2019 8:18 PM</a:t>
             </a:fld>
             <a:endParaRPr lang="en-US" dirty="0"/>
           </a:p>
@@ -3058,7 +3062,7 @@
             <a:fld id="{B4008EB6-D09E-4580-8CD6-DDB14511944F}" type="slidenum">
               <a:rPr lang="en-US" smtClean="0"/>
               <a:pPr/>
-              <a:t>3</a:t>
+              <a:t>4</a:t>
             </a:fld>
             <a:endParaRPr lang="en-US" dirty="0"/>
           </a:p>
@@ -3240,7 +3244,7 @@
           <a:p>
             <a:fld id="{386CE63F-9E7F-4C04-9D0D-FCA25A8E9E86}" type="datetime8">
               <a:rPr lang="en-US" smtClean="0"/>
-              <a:t>8/3/2019 8:57 PM</a:t>
+              <a:t>8/7/2019 8:18 PM</a:t>
             </a:fld>
             <a:endParaRPr lang="en-US" dirty="0"/>
           </a:p>
@@ -3264,7 +3268,7 @@
             <a:fld id="{B4008EB6-D09E-4580-8CD6-DDB14511944F}" type="slidenum">
               <a:rPr lang="en-US" smtClean="0"/>
               <a:pPr/>
-              <a:t>4</a:t>
+              <a:t>5</a:t>
             </a:fld>
             <a:endParaRPr lang="en-US" dirty="0"/>
           </a:p>
@@ -3421,7 +3425,7 @@
           <a:p>
             <a:fld id="{386CE63F-9E7F-4C04-9D0D-FCA25A8E9E86}" type="datetime8">
               <a:rPr lang="en-US" smtClean="0"/>
-              <a:t>8/3/2019 8:57 PM</a:t>
+              <a:t>8/7/2019 8:18 PM</a:t>
             </a:fld>
             <a:endParaRPr lang="en-US" dirty="0"/>
           </a:p>
@@ -3445,7 +3449,7 @@
             <a:fld id="{B4008EB6-D09E-4580-8CD6-DDB14511944F}" type="slidenum">
               <a:rPr lang="en-US" smtClean="0"/>
               <a:pPr/>
-              <a:t>5</a:t>
+              <a:t>6</a:t>
             </a:fld>
             <a:endParaRPr lang="en-US" dirty="0"/>
           </a:p>
@@ -3465,156 +3469,6 @@
 </file>
 
 <file path=ppt/notesSlides/notesSlide6.xml><?xml version="1.0" encoding="utf-8"?>
-<p:notes xmlns:a="http://schemas.openxmlformats.org/drawingml/2006/main" xmlns:r="http://schemas.openxmlformats.org/officeDocument/2006/relationships" xmlns:p="http://schemas.openxmlformats.org/presentationml/2006/main">
-  <p:cSld>
-    <p:spTree>
-      <p:nvGrpSpPr>
-        <p:cNvPr id="1" name=""/>
-        <p:cNvGrpSpPr/>
-        <p:nvPr/>
-      </p:nvGrpSpPr>
-      <p:grpSpPr>
-        <a:xfrm>
-          <a:off x="0" y="0"/>
-          <a:ext cx="0" cy="0"/>
-          <a:chOff x="0" y="0"/>
-          <a:chExt cx="0" cy="0"/>
-        </a:xfrm>
-      </p:grpSpPr>
-      <p:sp>
-        <p:nvSpPr>
-          <p:cNvPr id="2" name="Slide Image Placeholder 1"/>
-          <p:cNvSpPr>
-            <a:spLocks noGrp="1" noRot="1" noChangeAspect="1"/>
-          </p:cNvSpPr>
-          <p:nvPr>
-            <p:ph type="sldImg"/>
-          </p:nvPr>
-        </p:nvSpPr>
-        <p:spPr/>
-      </p:sp>
-      <p:sp>
-        <p:nvSpPr>
-          <p:cNvPr id="4" name="Slide Number Placeholder 3"/>
-          <p:cNvSpPr>
-            <a:spLocks noGrp="1"/>
-          </p:cNvSpPr>
-          <p:nvPr>
-            <p:ph type="sldNum" sz="quarter" idx="10"/>
-          </p:nvPr>
-        </p:nvSpPr>
-        <p:spPr/>
-        <p:txBody>
-          <a:bodyPr/>
-          <a:lstStyle/>
-          <a:p>
-            <a:pPr marL="0" marR="0" lvl="0" indent="0" algn="r" defTabSz="914367" rtl="0" eaLnBrk="1" fontAlgn="auto" latinLnBrk="0" hangingPunct="1">
-              <a:lnSpc>
-                <a:spcPct val="100000"/>
-              </a:lnSpc>
-              <a:spcBef>
-                <a:spcPts val="0"/>
-              </a:spcBef>
-              <a:spcAft>
-                <a:spcPts val="0"/>
-              </a:spcAft>
-              <a:buClrTx/>
-              <a:buSzTx/>
-              <a:buFontTx/>
-              <a:buNone/>
-              <a:tabLst/>
-              <a:defRPr/>
-            </a:pPr>
-            <a:fld id="{119BED95-0E28-4DB5-BA7D-C1A0CF87A247}" type="slidenum">
-              <a:rPr kumimoji="0" lang="en-US" sz="1200" b="0" i="0" u="none" strike="noStrike" kern="1200" cap="none" spc="0" normalizeH="0" baseline="0" noProof="0" smtClean="0">
-                <a:ln>
-                  <a:noFill/>
-                </a:ln>
-                <a:solidFill>
-                  <a:prstClr val="black"/>
-                </a:solidFill>
-                <a:effectLst/>
-                <a:uLnTx/>
-                <a:uFillTx/>
-                <a:latin typeface="Segoe UI" pitchFamily="34" charset="0"/>
-                <a:ea typeface="+mn-ea"/>
-                <a:cs typeface="+mn-cs"/>
-              </a:rPr>
-              <a:pPr marL="0" marR="0" lvl="0" indent="0" algn="r" defTabSz="914367" rtl="0" eaLnBrk="1" fontAlgn="auto" latinLnBrk="0" hangingPunct="1">
-                <a:lnSpc>
-                  <a:spcPct val="100000"/>
-                </a:lnSpc>
-                <a:spcBef>
-                  <a:spcPts val="0"/>
-                </a:spcBef>
-                <a:spcAft>
-                  <a:spcPts val="0"/>
-                </a:spcAft>
-                <a:buClrTx/>
-                <a:buSzTx/>
-                <a:buFontTx/>
-                <a:buNone/>
-                <a:tabLst/>
-                <a:defRPr/>
-              </a:pPr>
-              <a:t>7</a:t>
-            </a:fld>
-            <a:endParaRPr kumimoji="0" lang="en-US" sz="1200" b="0" i="0" u="none" strike="noStrike" kern="1200" cap="none" spc="0" normalizeH="0" baseline="0" noProof="0">
-              <a:ln>
-                <a:noFill/>
-              </a:ln>
-              <a:solidFill>
-                <a:prstClr val="black"/>
-              </a:solidFill>
-              <a:effectLst/>
-              <a:uLnTx/>
-              <a:uFillTx/>
-              <a:latin typeface="Segoe UI" pitchFamily="34" charset="0"/>
-              <a:ea typeface="+mn-ea"/>
-              <a:cs typeface="+mn-cs"/>
-            </a:endParaRPr>
-          </a:p>
-        </p:txBody>
-      </p:sp>
-      <p:sp>
-        <p:nvSpPr>
-          <p:cNvPr id="3" name="Notes Placeholder 2">
-            <a:extLst>
-              <a:ext uri="{FF2B5EF4-FFF2-40B4-BE49-F238E27FC236}">
-                <a16:creationId xmlns:a16="http://schemas.microsoft.com/office/drawing/2014/main" id="{45EC6E76-66DE-45B3-8242-A71CCBECD190}"/>
-              </a:ext>
-            </a:extLst>
-          </p:cNvPr>
-          <p:cNvSpPr>
-            <a:spLocks noGrp="1"/>
-          </p:cNvSpPr>
-          <p:nvPr>
-            <p:ph type="body" idx="1"/>
-          </p:nvPr>
-        </p:nvSpPr>
-        <p:spPr/>
-        <p:txBody>
-          <a:bodyPr/>
-          <a:lstStyle/>
-          <a:p>
-            <a:endParaRPr lang="en-GB" dirty="0"/>
-          </a:p>
-        </p:txBody>
-      </p:sp>
-    </p:spTree>
-    <p:extLst>
-      <p:ext uri="{BB962C8B-B14F-4D97-AF65-F5344CB8AC3E}">
-        <p14:creationId xmlns:p14="http://schemas.microsoft.com/office/powerpoint/2010/main" val="3163879471"/>
-      </p:ext>
-    </p:extLst>
-  </p:cSld>
-  <p:clrMapOvr>
-    <a:masterClrMapping/>
-  </p:clrMapOvr>
-</p:notes>
-</file>
-
-<file path=ppt/notesSlides/notesSlide7.xml><?xml version="1.0" encoding="utf-8"?>
 <p:notes xmlns:a="http://schemas.openxmlformats.org/drawingml/2006/main" xmlns:r="http://schemas.openxmlformats.org/officeDocument/2006/relationships" xmlns:p="http://schemas.openxmlformats.org/presentationml/2006/main">
   <p:cSld>
     <p:spTree>
@@ -3731,6 +3585,156 @@
           <p:cNvPr id="3" name="Notes Placeholder 2">
             <a:extLst>
               <a:ext uri="{FF2B5EF4-FFF2-40B4-BE49-F238E27FC236}">
+                <a16:creationId xmlns:a16="http://schemas.microsoft.com/office/drawing/2014/main" id="{45EC6E76-66DE-45B3-8242-A71CCBECD190}"/>
+              </a:ext>
+            </a:extLst>
+          </p:cNvPr>
+          <p:cNvSpPr>
+            <a:spLocks noGrp="1"/>
+          </p:cNvSpPr>
+          <p:nvPr>
+            <p:ph type="body" idx="1"/>
+          </p:nvPr>
+        </p:nvSpPr>
+        <p:spPr/>
+        <p:txBody>
+          <a:bodyPr/>
+          <a:lstStyle/>
+          <a:p>
+            <a:endParaRPr lang="en-GB" dirty="0"/>
+          </a:p>
+        </p:txBody>
+      </p:sp>
+    </p:spTree>
+    <p:extLst>
+      <p:ext uri="{BB962C8B-B14F-4D97-AF65-F5344CB8AC3E}">
+        <p14:creationId xmlns:p14="http://schemas.microsoft.com/office/powerpoint/2010/main" val="3163879471"/>
+      </p:ext>
+    </p:extLst>
+  </p:cSld>
+  <p:clrMapOvr>
+    <a:masterClrMapping/>
+  </p:clrMapOvr>
+</p:notes>
+</file>
+
+<file path=ppt/notesSlides/notesSlide7.xml><?xml version="1.0" encoding="utf-8"?>
+<p:notes xmlns:a="http://schemas.openxmlformats.org/drawingml/2006/main" xmlns:r="http://schemas.openxmlformats.org/officeDocument/2006/relationships" xmlns:p="http://schemas.openxmlformats.org/presentationml/2006/main">
+  <p:cSld>
+    <p:spTree>
+      <p:nvGrpSpPr>
+        <p:cNvPr id="1" name=""/>
+        <p:cNvGrpSpPr/>
+        <p:nvPr/>
+      </p:nvGrpSpPr>
+      <p:grpSpPr>
+        <a:xfrm>
+          <a:off x="0" y="0"/>
+          <a:ext cx="0" cy="0"/>
+          <a:chOff x="0" y="0"/>
+          <a:chExt cx="0" cy="0"/>
+        </a:xfrm>
+      </p:grpSpPr>
+      <p:sp>
+        <p:nvSpPr>
+          <p:cNvPr id="2" name="Slide Image Placeholder 1"/>
+          <p:cNvSpPr>
+            <a:spLocks noGrp="1" noRot="1" noChangeAspect="1"/>
+          </p:cNvSpPr>
+          <p:nvPr>
+            <p:ph type="sldImg"/>
+          </p:nvPr>
+        </p:nvSpPr>
+        <p:spPr/>
+      </p:sp>
+      <p:sp>
+        <p:nvSpPr>
+          <p:cNvPr id="4" name="Slide Number Placeholder 3"/>
+          <p:cNvSpPr>
+            <a:spLocks noGrp="1"/>
+          </p:cNvSpPr>
+          <p:nvPr>
+            <p:ph type="sldNum" sz="quarter" idx="10"/>
+          </p:nvPr>
+        </p:nvSpPr>
+        <p:spPr/>
+        <p:txBody>
+          <a:bodyPr/>
+          <a:lstStyle/>
+          <a:p>
+            <a:pPr marL="0" marR="0" lvl="0" indent="0" algn="r" defTabSz="914367" rtl="0" eaLnBrk="1" fontAlgn="auto" latinLnBrk="0" hangingPunct="1">
+              <a:lnSpc>
+                <a:spcPct val="100000"/>
+              </a:lnSpc>
+              <a:spcBef>
+                <a:spcPts val="0"/>
+              </a:spcBef>
+              <a:spcAft>
+                <a:spcPts val="0"/>
+              </a:spcAft>
+              <a:buClrTx/>
+              <a:buSzTx/>
+              <a:buFontTx/>
+              <a:buNone/>
+              <a:tabLst/>
+              <a:defRPr/>
+            </a:pPr>
+            <a:fld id="{119BED95-0E28-4DB5-BA7D-C1A0CF87A247}" type="slidenum">
+              <a:rPr kumimoji="0" lang="en-US" sz="1200" b="0" i="0" u="none" strike="noStrike" kern="1200" cap="none" spc="0" normalizeH="0" baseline="0" noProof="0" smtClean="0">
+                <a:ln>
+                  <a:noFill/>
+                </a:ln>
+                <a:solidFill>
+                  <a:prstClr val="black"/>
+                </a:solidFill>
+                <a:effectLst/>
+                <a:uLnTx/>
+                <a:uFillTx/>
+                <a:latin typeface="Segoe UI" pitchFamily="34" charset="0"/>
+                <a:ea typeface="+mn-ea"/>
+                <a:cs typeface="+mn-cs"/>
+              </a:rPr>
+              <a:pPr marL="0" marR="0" lvl="0" indent="0" algn="r" defTabSz="914367" rtl="0" eaLnBrk="1" fontAlgn="auto" latinLnBrk="0" hangingPunct="1">
+                <a:lnSpc>
+                  <a:spcPct val="100000"/>
+                </a:lnSpc>
+                <a:spcBef>
+                  <a:spcPts val="0"/>
+                </a:spcBef>
+                <a:spcAft>
+                  <a:spcPts val="0"/>
+                </a:spcAft>
+                <a:buClrTx/>
+                <a:buSzTx/>
+                <a:buFontTx/>
+                <a:buNone/>
+                <a:tabLst/>
+                <a:defRPr/>
+              </a:pPr>
+              <a:t>9</a:t>
+            </a:fld>
+            <a:endParaRPr kumimoji="0" lang="en-US" sz="1200" b="0" i="0" u="none" strike="noStrike" kern="1200" cap="none" spc="0" normalizeH="0" baseline="0" noProof="0">
+              <a:ln>
+                <a:noFill/>
+              </a:ln>
+              <a:solidFill>
+                <a:prstClr val="black"/>
+              </a:solidFill>
+              <a:effectLst/>
+              <a:uLnTx/>
+              <a:uFillTx/>
+              <a:latin typeface="Segoe UI" pitchFamily="34" charset="0"/>
+              <a:ea typeface="+mn-ea"/>
+              <a:cs typeface="+mn-cs"/>
+            </a:endParaRPr>
+          </a:p>
+        </p:txBody>
+      </p:sp>
+      <p:sp>
+        <p:nvSpPr>
+          <p:cNvPr id="3" name="Notes Placeholder 2">
+            <a:extLst>
+              <a:ext uri="{FF2B5EF4-FFF2-40B4-BE49-F238E27FC236}">
                 <a16:creationId xmlns:a16="http://schemas.microsoft.com/office/drawing/2014/main" id="{BF3FC712-3A6E-4AD1-B707-B7639C04572D}"/>
               </a:ext>
             </a:extLst>
@@ -3908,7 +3912,7 @@
           <a:p>
             <a:fld id="{386CE63F-9E7F-4C04-9D0D-FCA25A8E9E86}" type="datetime8">
               <a:rPr lang="en-US" smtClean="0"/>
-              <a:t>8/3/2019 8:57 PM</a:t>
+              <a:t>8/7/2019 8:18 PM</a:t>
             </a:fld>
             <a:endParaRPr lang="en-US" dirty="0"/>
           </a:p>
@@ -3932,7 +3936,7 @@
             <a:fld id="{B4008EB6-D09E-4580-8CD6-DDB14511944F}" type="slidenum">
               <a:rPr lang="en-US" smtClean="0"/>
               <a:pPr/>
-              <a:t>9</a:t>
+              <a:t>10</a:t>
             </a:fld>
             <a:endParaRPr lang="en-US" dirty="0"/>
           </a:p>
@@ -4104,7 +4108,7 @@
           <a:p>
             <a:fld id="{386CE63F-9E7F-4C04-9D0D-FCA25A8E9E86}" type="datetime8">
               <a:rPr lang="en-US" smtClean="0"/>
-              <a:t>8/3/2019 8:57 PM</a:t>
+              <a:t>8/7/2019 8:18 PM</a:t>
             </a:fld>
             <a:endParaRPr lang="en-US" dirty="0"/>
           </a:p>
@@ -4128,7 +4132,7 @@
             <a:fld id="{B4008EB6-D09E-4580-8CD6-DDB14511944F}" type="slidenum">
               <a:rPr lang="en-US" smtClean="0"/>
               <a:pPr/>
-              <a:t>10</a:t>
+              <a:t>11</a:t>
             </a:fld>
             <a:endParaRPr lang="en-US" dirty="0"/>
           </a:p>
@@ -11271,7 +11275,7 @@
         <p:fade/>
       </p:transition>
     </mc:Choice>
-    <mc:Fallback xmlns:a16="http://schemas.microsoft.com/office/drawing/2014/main" xmlns="">
+    <mc:Fallback xmlns="" xmlns:a16="http://schemas.microsoft.com/office/drawing/2014/main">
       <p:transition spd="med">
         <p:fade/>
       </p:transition>
@@ -11281,6 +11285,154 @@
 </file>
 
 <file path=ppt/slides/slide10.xml><?xml version="1.0" encoding="utf-8"?>
+<p:sld xmlns:a="http://schemas.openxmlformats.org/drawingml/2006/main" xmlns:r="http://schemas.openxmlformats.org/officeDocument/2006/relationships" xmlns:p="http://schemas.openxmlformats.org/presentationml/2006/main">
+  <p:cSld>
+    <p:spTree>
+      <p:nvGrpSpPr>
+        <p:cNvPr id="1" name=""/>
+        <p:cNvGrpSpPr/>
+        <p:nvPr/>
+      </p:nvGrpSpPr>
+      <p:grpSpPr>
+        <a:xfrm>
+          <a:off x="0" y="0"/>
+          <a:ext cx="0" cy="0"/>
+          <a:chOff x="0" y="0"/>
+          <a:chExt cx="0" cy="0"/>
+        </a:xfrm>
+      </p:grpSpPr>
+      <p:sp>
+        <p:nvSpPr>
+          <p:cNvPr id="2" name="Title 1">
+            <a:extLst>
+              <a:ext uri="{FF2B5EF4-FFF2-40B4-BE49-F238E27FC236}">
+                <a16:creationId xmlns:a16="http://schemas.microsoft.com/office/drawing/2014/main" id="{88C0D106-A291-4CC2-A8F2-A319D6C3784E}"/>
+              </a:ext>
+            </a:extLst>
+          </p:cNvPr>
+          <p:cNvSpPr>
+            <a:spLocks noGrp="1"/>
+          </p:cNvSpPr>
+          <p:nvPr>
+            <p:ph type="title"/>
+          </p:nvPr>
+        </p:nvSpPr>
+        <p:spPr/>
+        <p:txBody>
+          <a:bodyPr/>
+          <a:lstStyle/>
+          <a:p>
+            <a:r>
+              <a:rPr lang="en-GB" dirty="0"/>
+              <a:t>Functions as a Service</a:t>
+            </a:r>
+          </a:p>
+        </p:txBody>
+      </p:sp>
+      <p:sp>
+        <p:nvSpPr>
+          <p:cNvPr id="3" name="Text Placeholder 2">
+            <a:extLst>
+              <a:ext uri="{FF2B5EF4-FFF2-40B4-BE49-F238E27FC236}">
+                <a16:creationId xmlns:a16="http://schemas.microsoft.com/office/drawing/2014/main" id="{E9081892-1542-45C0-BE1A-CECBF9F4330A}"/>
+              </a:ext>
+            </a:extLst>
+          </p:cNvPr>
+          <p:cNvSpPr>
+            <a:spLocks noGrp="1"/>
+          </p:cNvSpPr>
+          <p:nvPr>
+            <p:ph type="body" sz="quarter" idx="10"/>
+          </p:nvPr>
+        </p:nvSpPr>
+        <p:spPr>
+          <a:xfrm>
+            <a:off x="584201" y="1435497"/>
+            <a:ext cx="8146282" cy="1982081"/>
+          </a:xfrm>
+        </p:spPr>
+        <p:txBody>
+          <a:bodyPr/>
+          <a:lstStyle/>
+          <a:p>
+            <a:r>
+              <a:rPr lang="en-US" dirty="0"/>
+              <a:t>Just code running on an abstracted platform</a:t>
+            </a:r>
+          </a:p>
+          <a:p>
+            <a:r>
+              <a:rPr lang="en-US" dirty="0"/>
+              <a:t>Ephemeral and event driven</a:t>
+            </a:r>
+          </a:p>
+          <a:p>
+            <a:r>
+              <a:rPr lang="en-US" dirty="0"/>
+              <a:t>Low management, low cost, high flexibility</a:t>
+            </a:r>
+          </a:p>
+          <a:p>
+            <a:r>
+              <a:rPr lang="en-US" dirty="0"/>
+              <a:t>Local runtime available</a:t>
+            </a:r>
+          </a:p>
+        </p:txBody>
+      </p:sp>
+      <p:pic>
+        <p:nvPicPr>
+          <p:cNvPr id="5" name="Graphic 4">
+            <a:extLst>
+              <a:ext uri="{FF2B5EF4-FFF2-40B4-BE49-F238E27FC236}">
+                <a16:creationId xmlns:a16="http://schemas.microsoft.com/office/drawing/2014/main" id="{1DCCE5FA-B3CF-4473-AA3C-1F5F45071822}"/>
+              </a:ext>
+            </a:extLst>
+          </p:cNvPr>
+          <p:cNvPicPr>
+            <a:picLocks noChangeAspect="1"/>
+          </p:cNvPicPr>
+          <p:nvPr/>
+        </p:nvPicPr>
+        <p:blipFill>
+          <a:blip r:embed="rId3">
+            <a:extLst>
+              <a:ext uri="{96DAC541-7B7A-43D3-8B79-37D633B846F1}">
+                <asvg:svgBlip xmlns:asvg="http://schemas.microsoft.com/office/drawing/2016/SVG/main" r:embed="rId4"/>
+              </a:ext>
+            </a:extLst>
+          </a:blip>
+          <a:stretch>
+            <a:fillRect/>
+          </a:stretch>
+        </p:blipFill>
+        <p:spPr>
+          <a:xfrm>
+            <a:off x="9697720" y="1011198"/>
+            <a:ext cx="1905000" cy="1905000"/>
+          </a:xfrm>
+          <a:prstGeom prst="rect">
+            <a:avLst/>
+          </a:prstGeom>
+        </p:spPr>
+      </p:pic>
+    </p:spTree>
+    <p:extLst>
+      <p:ext uri="{BB962C8B-B14F-4D97-AF65-F5344CB8AC3E}">
+        <p14:creationId xmlns:p14="http://schemas.microsoft.com/office/powerpoint/2010/main" val="898448139"/>
+      </p:ext>
+    </p:extLst>
+  </p:cSld>
+  <p:clrMapOvr>
+    <a:masterClrMapping/>
+  </p:clrMapOvr>
+  <p:transition>
+    <p:fade/>
+  </p:transition>
+</p:sld>
+</file>
+
+<file path=ppt/slides/slide11.xml><?xml version="1.0" encoding="utf-8"?>
 <p:sld xmlns:a="http://schemas.openxmlformats.org/drawingml/2006/main" xmlns:r="http://schemas.openxmlformats.org/officeDocument/2006/relationships" xmlns:p="http://schemas.openxmlformats.org/presentationml/2006/main">
   <p:cSld>
     <p:spTree>
@@ -12099,7 +12251,7 @@
 </p:sld>
 </file>
 
-<file path=ppt/slides/slide11.xml><?xml version="1.0" encoding="utf-8"?>
+<file path=ppt/slides/slide12.xml><?xml version="1.0" encoding="utf-8"?>
 <p:sld xmlns:a="http://schemas.openxmlformats.org/drawingml/2006/main" xmlns:r="http://schemas.openxmlformats.org/officeDocument/2006/relationships" xmlns:p="http://schemas.openxmlformats.org/presentationml/2006/main">
   <p:cSld>
     <p:spTree>
@@ -12297,7 +12449,7 @@
 </p:sld>
 </file>
 
-<file path=ppt/slides/slide12.xml><?xml version="1.0" encoding="utf-8"?>
+<file path=ppt/slides/slide13.xml><?xml version="1.0" encoding="utf-8"?>
 <p:sld xmlns:a="http://schemas.openxmlformats.org/drawingml/2006/main" xmlns:r="http://schemas.openxmlformats.org/officeDocument/2006/relationships" xmlns:p="http://schemas.openxmlformats.org/presentationml/2006/main">
   <p:cSld>
     <p:spTree>
@@ -15296,7 +15448,7 @@
 </p:sld>
 </file>
 
-<file path=ppt/slides/slide13.xml><?xml version="1.0" encoding="utf-8"?>
+<file path=ppt/slides/slide14.xml><?xml version="1.0" encoding="utf-8"?>
 <p:sld xmlns:a="http://schemas.openxmlformats.org/drawingml/2006/main" xmlns:r="http://schemas.openxmlformats.org/officeDocument/2006/relationships" xmlns:p="http://schemas.openxmlformats.org/presentationml/2006/main">
   <p:cSld>
     <p:spTree>
@@ -15881,7 +16033,7 @@
 </p:sld>
 </file>
 
-<file path=ppt/slides/slide14.xml><?xml version="1.0" encoding="utf-8"?>
+<file path=ppt/slides/slide15.xml><?xml version="1.0" encoding="utf-8"?>
 <p:sld xmlns:a="http://schemas.openxmlformats.org/drawingml/2006/main" xmlns:r="http://schemas.openxmlformats.org/officeDocument/2006/relationships" xmlns:p="http://schemas.openxmlformats.org/presentationml/2006/main">
   <p:cSld>
     <p:spTree>
@@ -16021,7 +16173,7 @@
 </p:sld>
 </file>
 
-<file path=ppt/slides/slide15.xml><?xml version="1.0" encoding="utf-8"?>
+<file path=ppt/slides/slide16.xml><?xml version="1.0" encoding="utf-8"?>
 <p:sld xmlns:a="http://schemas.openxmlformats.org/drawingml/2006/main" xmlns:r="http://schemas.openxmlformats.org/officeDocument/2006/relationships" xmlns:p="http://schemas.openxmlformats.org/presentationml/2006/main">
   <p:cSld>
     <p:bg>
@@ -16134,7 +16286,7 @@
 </p:sld>
 </file>
 
-<file path=ppt/slides/slide16.xml><?xml version="1.0" encoding="utf-8"?>
+<file path=ppt/slides/slide17.xml><?xml version="1.0" encoding="utf-8"?>
 <p:sld xmlns:a="http://schemas.openxmlformats.org/drawingml/2006/main" xmlns:r="http://schemas.openxmlformats.org/officeDocument/2006/relationships" xmlns:p="http://schemas.openxmlformats.org/presentationml/2006/main">
   <p:cSld>
     <p:spTree>
@@ -16200,7 +16352,7 @@
 </p:sld>
 </file>
 
-<file path=ppt/slides/slide17.xml><?xml version="1.0" encoding="utf-8"?>
+<file path=ppt/slides/slide18.xml><?xml version="1.0" encoding="utf-8"?>
 <p:sld xmlns:a="http://schemas.openxmlformats.org/drawingml/2006/main" xmlns:r="http://schemas.openxmlformats.org/officeDocument/2006/relationships" xmlns:p="http://schemas.openxmlformats.org/presentationml/2006/main">
   <p:cSld>
     <p:spTree>
@@ -16338,7 +16490,7 @@
 </p:sld>
 </file>
 
-<file path=ppt/slides/slide18.xml><?xml version="1.0" encoding="utf-8"?>
+<file path=ppt/slides/slide19.xml><?xml version="1.0" encoding="utf-8"?>
 <p:sld xmlns:a="http://schemas.openxmlformats.org/drawingml/2006/main" xmlns:r="http://schemas.openxmlformats.org/officeDocument/2006/relationships" xmlns:p="http://schemas.openxmlformats.org/presentationml/2006/main">
   <p:cSld>
     <p:spTree>
@@ -16490,7 +16642,273 @@
 </p:sld>
 </file>
 
-<file path=ppt/slides/slide19.xml><?xml version="1.0" encoding="utf-8"?>
+<file path=ppt/slides/slide2.xml><?xml version="1.0" encoding="utf-8"?>
+<p:sld xmlns:a="http://schemas.openxmlformats.org/drawingml/2006/main" xmlns:r="http://schemas.openxmlformats.org/officeDocument/2006/relationships" xmlns:p="http://schemas.openxmlformats.org/presentationml/2006/main">
+  <p:cSld>
+    <p:spTree>
+      <p:nvGrpSpPr>
+        <p:cNvPr id="1" name=""/>
+        <p:cNvGrpSpPr/>
+        <p:nvPr/>
+      </p:nvGrpSpPr>
+      <p:grpSpPr>
+        <a:xfrm>
+          <a:off x="0" y="0"/>
+          <a:ext cx="0" cy="0"/>
+          <a:chOff x="0" y="0"/>
+          <a:chExt cx="0" cy="0"/>
+        </a:xfrm>
+      </p:grpSpPr>
+      <p:sp>
+        <p:nvSpPr>
+          <p:cNvPr id="2" name="Title 1">
+            <a:extLst>
+              <a:ext uri="{FF2B5EF4-FFF2-40B4-BE49-F238E27FC236}">
+                <a16:creationId xmlns:a16="http://schemas.microsoft.com/office/drawing/2014/main" id="{989C9385-83F0-4BC9-914E-35683E0F48E1}"/>
+              </a:ext>
+            </a:extLst>
+          </p:cNvPr>
+          <p:cNvSpPr>
+            <a:spLocks noGrp="1"/>
+          </p:cNvSpPr>
+          <p:nvPr>
+            <p:ph type="title"/>
+          </p:nvPr>
+        </p:nvSpPr>
+        <p:spPr/>
+        <p:txBody>
+          <a:bodyPr/>
+          <a:lstStyle/>
+          <a:p>
+            <a:r>
+              <a:rPr lang="en-GB" dirty="0"/>
+              <a:t>Agenda</a:t>
+            </a:r>
+          </a:p>
+        </p:txBody>
+      </p:sp>
+      <p:sp>
+        <p:nvSpPr>
+          <p:cNvPr id="3" name="Text Placeholder 2">
+            <a:extLst>
+              <a:ext uri="{FF2B5EF4-FFF2-40B4-BE49-F238E27FC236}">
+                <a16:creationId xmlns:a16="http://schemas.microsoft.com/office/drawing/2014/main" id="{3E15091B-E51C-4B25-B0B2-44B83E14D708}"/>
+              </a:ext>
+            </a:extLst>
+          </p:cNvPr>
+          <p:cNvSpPr>
+            <a:spLocks noGrp="1"/>
+          </p:cNvSpPr>
+          <p:nvPr>
+            <p:ph type="body" sz="quarter" idx="10"/>
+          </p:nvPr>
+        </p:nvSpPr>
+        <p:spPr>
+          <a:xfrm>
+            <a:off x="584200" y="1435497"/>
+            <a:ext cx="11018520" cy="2499146"/>
+          </a:xfrm>
+        </p:spPr>
+        <p:txBody>
+          <a:bodyPr/>
+          <a:lstStyle/>
+          <a:p>
+            <a:r>
+              <a:rPr lang="en-GB" dirty="0"/>
+              <a:t>Services</a:t>
+            </a:r>
+          </a:p>
+          <a:p>
+            <a:r>
+              <a:rPr lang="en-GB" dirty="0"/>
+              <a:t>Containers</a:t>
+            </a:r>
+          </a:p>
+          <a:p>
+            <a:r>
+              <a:rPr lang="en-GB" dirty="0"/>
+              <a:t>Serverless</a:t>
+            </a:r>
+          </a:p>
+          <a:p>
+            <a:r>
+              <a:rPr lang="en-GB" dirty="0"/>
+              <a:t>KEDA</a:t>
+            </a:r>
+          </a:p>
+          <a:p>
+            <a:r>
+              <a:rPr lang="en-GB" dirty="0"/>
+              <a:t>Futures</a:t>
+            </a:r>
+          </a:p>
+        </p:txBody>
+      </p:sp>
+    </p:spTree>
+    <p:extLst>
+      <p:ext uri="{BB962C8B-B14F-4D97-AF65-F5344CB8AC3E}">
+        <p14:creationId xmlns:p14="http://schemas.microsoft.com/office/powerpoint/2010/main" val="3074542878"/>
+      </p:ext>
+    </p:extLst>
+  </p:cSld>
+  <p:clrMapOvr>
+    <a:masterClrMapping/>
+  </p:clrMapOvr>
+  <p:transition>
+    <p:fade/>
+  </p:transition>
+</p:sld>
+</file>
+
+<file path=ppt/slides/slide20.xml><?xml version="1.0" encoding="utf-8"?>
+<p:sld xmlns:a="http://schemas.openxmlformats.org/drawingml/2006/main" xmlns:r="http://schemas.openxmlformats.org/officeDocument/2006/relationships" xmlns:p="http://schemas.openxmlformats.org/presentationml/2006/main">
+  <p:cSld>
+    <p:spTree>
+      <p:nvGrpSpPr>
+        <p:cNvPr id="1" name=""/>
+        <p:cNvGrpSpPr/>
+        <p:nvPr/>
+      </p:nvGrpSpPr>
+      <p:grpSpPr>
+        <a:xfrm>
+          <a:off x="0" y="0"/>
+          <a:ext cx="0" cy="0"/>
+          <a:chOff x="0" y="0"/>
+          <a:chExt cx="0" cy="0"/>
+        </a:xfrm>
+      </p:grpSpPr>
+      <p:sp>
+        <p:nvSpPr>
+          <p:cNvPr id="2" name="Title 1">
+            <a:extLst>
+              <a:ext uri="{FF2B5EF4-FFF2-40B4-BE49-F238E27FC236}">
+                <a16:creationId xmlns:a16="http://schemas.microsoft.com/office/drawing/2014/main" id="{086597DA-822B-4DB3-A75F-8C7359672736}"/>
+              </a:ext>
+            </a:extLst>
+          </p:cNvPr>
+          <p:cNvSpPr>
+            <a:spLocks noGrp="1"/>
+          </p:cNvSpPr>
+          <p:nvPr>
+            <p:ph type="title"/>
+          </p:nvPr>
+        </p:nvSpPr>
+        <p:spPr/>
+        <p:txBody>
+          <a:bodyPr/>
+          <a:lstStyle/>
+          <a:p>
+            <a:r>
+              <a:rPr lang="en-GB" dirty="0"/>
+              <a:t>Resources</a:t>
+            </a:r>
+          </a:p>
+        </p:txBody>
+      </p:sp>
+      <p:sp>
+        <p:nvSpPr>
+          <p:cNvPr id="3" name="Text Placeholder 2">
+            <a:extLst>
+              <a:ext uri="{FF2B5EF4-FFF2-40B4-BE49-F238E27FC236}">
+                <a16:creationId xmlns:a16="http://schemas.microsoft.com/office/drawing/2014/main" id="{A7F0EDE9-0D8D-4B36-868B-72A3E59116AF}"/>
+              </a:ext>
+            </a:extLst>
+          </p:cNvPr>
+          <p:cNvSpPr>
+            <a:spLocks noGrp="1"/>
+          </p:cNvSpPr>
+          <p:nvPr>
+            <p:ph type="body" sz="quarter" idx="10"/>
+          </p:nvPr>
+        </p:nvSpPr>
+        <p:spPr>
+          <a:xfrm>
+            <a:off x="584200" y="1435497"/>
+            <a:ext cx="11018520" cy="4050340"/>
+          </a:xfrm>
+        </p:spPr>
+        <p:txBody>
+          <a:bodyPr/>
+          <a:lstStyle/>
+          <a:p>
+            <a:r>
+              <a:rPr lang="en-GB" dirty="0">
+                <a:hlinkClick r:id="rId2"/>
+              </a:rPr>
+              <a:t>https://github.com/kedacore/keda</a:t>
+            </a:r>
+            <a:endParaRPr lang="en-GB" dirty="0"/>
+          </a:p>
+          <a:p>
+            <a:r>
+              <a:rPr lang="en-GB" dirty="0">
+                <a:hlinkClick r:id="rId3"/>
+              </a:rPr>
+              <a:t>https://github.com/MarkXA/keda-demo</a:t>
+            </a:r>
+            <a:endParaRPr lang="en-GB" dirty="0"/>
+          </a:p>
+          <a:p>
+            <a:endParaRPr lang="en-GB" dirty="0"/>
+          </a:p>
+          <a:p>
+            <a:pPr marL="0" indent="0">
+              <a:buNone/>
+            </a:pPr>
+            <a:r>
+              <a:rPr lang="en-GB" b="1" dirty="0"/>
+              <a:t>Me:</a:t>
+            </a:r>
+          </a:p>
+          <a:p>
+            <a:r>
+              <a:rPr lang="en-GB" dirty="0">
+                <a:hlinkClick r:id="rId4"/>
+              </a:rPr>
+              <a:t>https://linkedin.com/in/MarkXA</a:t>
+            </a:r>
+            <a:endParaRPr lang="en-GB" dirty="0"/>
+          </a:p>
+          <a:p>
+            <a:r>
+              <a:rPr lang="en-GB" dirty="0">
+                <a:hlinkClick r:id="rId5"/>
+              </a:rPr>
+              <a:t>https://twitter.com/MarkXA</a:t>
+            </a:r>
+            <a:endParaRPr lang="en-GB" dirty="0"/>
+          </a:p>
+          <a:p>
+            <a:r>
+              <a:rPr lang="en-GB" dirty="0">
+                <a:hlinkClick r:id="rId6"/>
+              </a:rPr>
+              <a:t>markxa@markxa.com</a:t>
+            </a:r>
+            <a:endParaRPr lang="en-GB" dirty="0"/>
+          </a:p>
+          <a:p>
+            <a:endParaRPr lang="en-GB" dirty="0"/>
+          </a:p>
+        </p:txBody>
+      </p:sp>
+    </p:spTree>
+    <p:extLst>
+      <p:ext uri="{BB962C8B-B14F-4D97-AF65-F5344CB8AC3E}">
+        <p14:creationId xmlns:p14="http://schemas.microsoft.com/office/powerpoint/2010/main" val="661371721"/>
+      </p:ext>
+    </p:extLst>
+  </p:cSld>
+  <p:clrMapOvr>
+    <a:masterClrMapping/>
+  </p:clrMapOvr>
+  <p:transition>
+    <p:fade/>
+  </p:transition>
+</p:sld>
+</file>
+
+<file path=ppt/slides/slide21.xml><?xml version="1.0" encoding="utf-8"?>
 <p:sld xmlns:a="http://schemas.openxmlformats.org/drawingml/2006/main" xmlns:r="http://schemas.openxmlformats.org/officeDocument/2006/relationships" xmlns:p="http://schemas.openxmlformats.org/presentationml/2006/main">
   <p:cSld>
     <p:spTree>
@@ -16623,7 +17041,7 @@
 </p:sld>
 </file>
 
-<file path=ppt/slides/slide2.xml><?xml version="1.0" encoding="utf-8"?>
+<file path=ppt/slides/slide3.xml><?xml version="1.0" encoding="utf-8"?>
 <p:sld xmlns:a="http://schemas.openxmlformats.org/drawingml/2006/main" xmlns:r="http://schemas.openxmlformats.org/officeDocument/2006/relationships" xmlns:p="http://schemas.openxmlformats.org/presentationml/2006/main">
   <p:cSld>
     <p:spTree>
@@ -16739,7 +17157,7 @@
 </p:sld>
 </file>
 
-<file path=ppt/slides/slide3.xml><?xml version="1.0" encoding="utf-8"?>
+<file path=ppt/slides/slide4.xml><?xml version="1.0" encoding="utf-8"?>
 <p:sld xmlns:a="http://schemas.openxmlformats.org/drawingml/2006/main" xmlns:r="http://schemas.openxmlformats.org/officeDocument/2006/relationships" xmlns:p="http://schemas.openxmlformats.org/presentationml/2006/main">
   <p:cSld>
     <p:spTree>
@@ -18188,7 +18606,7 @@
 </p:sld>
 </file>
 
-<file path=ppt/slides/slide4.xml><?xml version="1.0" encoding="utf-8"?>
+<file path=ppt/slides/slide5.xml><?xml version="1.0" encoding="utf-8"?>
 <p:sld xmlns:a="http://schemas.openxmlformats.org/drawingml/2006/main" xmlns:r="http://schemas.openxmlformats.org/officeDocument/2006/relationships" xmlns:p="http://schemas.openxmlformats.org/presentationml/2006/main">
   <p:cSld>
     <p:spTree>
@@ -18342,7 +18760,7 @@
 </p:sld>
 </file>
 
-<file path=ppt/slides/slide5.xml><?xml version="1.0" encoding="utf-8"?>
+<file path=ppt/slides/slide6.xml><?xml version="1.0" encoding="utf-8"?>
 <p:sld xmlns:a="http://schemas.openxmlformats.org/drawingml/2006/main" xmlns:r="http://schemas.openxmlformats.org/officeDocument/2006/relationships" xmlns:p="http://schemas.openxmlformats.org/presentationml/2006/main">
   <p:cSld>
     <p:spTree>
@@ -20927,7 +21345,7 @@
 </p:sld>
 </file>
 
-<file path=ppt/slides/slide6.xml><?xml version="1.0" encoding="utf-8"?>
+<file path=ppt/slides/slide7.xml><?xml version="1.0" encoding="utf-8"?>
 <p:sld xmlns:a="http://schemas.openxmlformats.org/drawingml/2006/main" xmlns:r="http://schemas.openxmlformats.org/officeDocument/2006/relationships" xmlns:p="http://schemas.openxmlformats.org/presentationml/2006/main">
   <p:cSld>
     <p:spTree>
@@ -20993,7 +21411,7 @@
 </p:sld>
 </file>
 
-<file path=ppt/slides/slide7.xml><?xml version="1.0" encoding="utf-8"?>
+<file path=ppt/slides/slide8.xml><?xml version="1.0" encoding="utf-8"?>
 <p:sld xmlns:a="http://schemas.openxmlformats.org/drawingml/2006/main" xmlns:r="http://schemas.openxmlformats.org/officeDocument/2006/relationships" xmlns:p="http://schemas.openxmlformats.org/presentationml/2006/main">
   <p:cSld>
     <p:spTree>
@@ -21538,7 +21956,7 @@
 </p:sld>
 </file>
 
-<file path=ppt/slides/slide8.xml><?xml version="1.0" encoding="utf-8"?>
+<file path=ppt/slides/slide9.xml><?xml version="1.0" encoding="utf-8"?>
 <p:sld xmlns:a="http://schemas.openxmlformats.org/drawingml/2006/main" xmlns:r="http://schemas.openxmlformats.org/officeDocument/2006/relationships" xmlns:p="http://schemas.openxmlformats.org/presentationml/2006/main">
   <p:cSld>
     <p:spTree>
@@ -22390,154 +22808,6 @@
     <p:extLst>
       <p:ext uri="{BB962C8B-B14F-4D97-AF65-F5344CB8AC3E}">
         <p14:creationId xmlns:p14="http://schemas.microsoft.com/office/powerpoint/2010/main" val="1910710880"/>
-      </p:ext>
-    </p:extLst>
-  </p:cSld>
-  <p:clrMapOvr>
-    <a:masterClrMapping/>
-  </p:clrMapOvr>
-  <p:transition>
-    <p:fade/>
-  </p:transition>
-</p:sld>
-</file>
-
-<file path=ppt/slides/slide9.xml><?xml version="1.0" encoding="utf-8"?>
-<p:sld xmlns:a="http://schemas.openxmlformats.org/drawingml/2006/main" xmlns:r="http://schemas.openxmlformats.org/officeDocument/2006/relationships" xmlns:p="http://schemas.openxmlformats.org/presentationml/2006/main">
-  <p:cSld>
-    <p:spTree>
-      <p:nvGrpSpPr>
-        <p:cNvPr id="1" name=""/>
-        <p:cNvGrpSpPr/>
-        <p:nvPr/>
-      </p:nvGrpSpPr>
-      <p:grpSpPr>
-        <a:xfrm>
-          <a:off x="0" y="0"/>
-          <a:ext cx="0" cy="0"/>
-          <a:chOff x="0" y="0"/>
-          <a:chExt cx="0" cy="0"/>
-        </a:xfrm>
-      </p:grpSpPr>
-      <p:sp>
-        <p:nvSpPr>
-          <p:cNvPr id="2" name="Title 1">
-            <a:extLst>
-              <a:ext uri="{FF2B5EF4-FFF2-40B4-BE49-F238E27FC236}">
-                <a16:creationId xmlns:a16="http://schemas.microsoft.com/office/drawing/2014/main" id="{88C0D106-A291-4CC2-A8F2-A319D6C3784E}"/>
-              </a:ext>
-            </a:extLst>
-          </p:cNvPr>
-          <p:cNvSpPr>
-            <a:spLocks noGrp="1"/>
-          </p:cNvSpPr>
-          <p:nvPr>
-            <p:ph type="title"/>
-          </p:nvPr>
-        </p:nvSpPr>
-        <p:spPr/>
-        <p:txBody>
-          <a:bodyPr/>
-          <a:lstStyle/>
-          <a:p>
-            <a:r>
-              <a:rPr lang="en-GB" dirty="0"/>
-              <a:t>Functions as a Service</a:t>
-            </a:r>
-          </a:p>
-        </p:txBody>
-      </p:sp>
-      <p:sp>
-        <p:nvSpPr>
-          <p:cNvPr id="3" name="Text Placeholder 2">
-            <a:extLst>
-              <a:ext uri="{FF2B5EF4-FFF2-40B4-BE49-F238E27FC236}">
-                <a16:creationId xmlns:a16="http://schemas.microsoft.com/office/drawing/2014/main" id="{E9081892-1542-45C0-BE1A-CECBF9F4330A}"/>
-              </a:ext>
-            </a:extLst>
-          </p:cNvPr>
-          <p:cNvSpPr>
-            <a:spLocks noGrp="1"/>
-          </p:cNvSpPr>
-          <p:nvPr>
-            <p:ph type="body" sz="quarter" idx="10"/>
-          </p:nvPr>
-        </p:nvSpPr>
-        <p:spPr>
-          <a:xfrm>
-            <a:off x="584201" y="1435497"/>
-            <a:ext cx="8146282" cy="1982081"/>
-          </a:xfrm>
-        </p:spPr>
-        <p:txBody>
-          <a:bodyPr/>
-          <a:lstStyle/>
-          <a:p>
-            <a:r>
-              <a:rPr lang="en-US" dirty="0"/>
-              <a:t>Just code running on an abstracted platform</a:t>
-            </a:r>
-          </a:p>
-          <a:p>
-            <a:r>
-              <a:rPr lang="en-US" dirty="0"/>
-              <a:t>Ephemeral and event driven</a:t>
-            </a:r>
-          </a:p>
-          <a:p>
-            <a:r>
-              <a:rPr lang="en-US" dirty="0"/>
-              <a:t>Low management, low cost, high flexibility</a:t>
-            </a:r>
-          </a:p>
-          <a:p>
-            <a:r>
-              <a:rPr lang="en-US" dirty="0"/>
-              <a:t>Local runtime available</a:t>
-            </a:r>
-          </a:p>
-        </p:txBody>
-      </p:sp>
-      <p:pic>
-        <p:nvPicPr>
-          <p:cNvPr id="5" name="Graphic 4">
-            <a:extLst>
-              <a:ext uri="{FF2B5EF4-FFF2-40B4-BE49-F238E27FC236}">
-                <a16:creationId xmlns:a16="http://schemas.microsoft.com/office/drawing/2014/main" id="{1DCCE5FA-B3CF-4473-AA3C-1F5F45071822}"/>
-              </a:ext>
-            </a:extLst>
-          </p:cNvPr>
-          <p:cNvPicPr>
-            <a:picLocks noChangeAspect="1"/>
-          </p:cNvPicPr>
-          <p:nvPr/>
-        </p:nvPicPr>
-        <p:blipFill>
-          <a:blip r:embed="rId3">
-            <a:extLst>
-              <a:ext uri="{96DAC541-7B7A-43D3-8B79-37D633B846F1}">
-                <asvg:svgBlip xmlns:asvg="http://schemas.microsoft.com/office/drawing/2016/SVG/main" r:embed="rId4"/>
-              </a:ext>
-            </a:extLst>
-          </a:blip>
-          <a:stretch>
-            <a:fillRect/>
-          </a:stretch>
-        </p:blipFill>
-        <p:spPr>
-          <a:xfrm>
-            <a:off x="9697720" y="1011198"/>
-            <a:ext cx="1905000" cy="1905000"/>
-          </a:xfrm>
-          <a:prstGeom prst="rect">
-            <a:avLst/>
-          </a:prstGeom>
-        </p:spPr>
-      </p:pic>
-    </p:spTree>
-    <p:extLst>
-      <p:ext uri="{BB962C8B-B14F-4D97-AF65-F5344CB8AC3E}">
-        <p14:creationId xmlns:p14="http://schemas.microsoft.com/office/powerpoint/2010/main" val="898448139"/>
       </p:ext>
     </p:extLst>
   </p:cSld>
@@ -23410,9 +23680,12 @@
 </file>
 
 <file path=customXml/item1.xml><?xml version="1.0" encoding="utf-8"?>
-<p:properties xmlns:p="http://schemas.microsoft.com/office/2006/metadata/properties" xmlns:xsi="http://www.w3.org/2001/XMLSchema-instance" xmlns:pc="http://schemas.microsoft.com/office/infopath/2007/PartnerControls">
-  <documentManagement/>
-</p:properties>
+<?mso-contentType ?>
+<FormTemplates xmlns="http://schemas.microsoft.com/sharepoint/v3/contenttype/forms">
+  <Display>DocumentLibraryForm</Display>
+  <Edit>DocumentLibraryForm</Edit>
+  <New>DocumentLibraryForm</New>
+</FormTemplates>
 </file>
 
 <file path=customXml/item2.xml><?xml version="1.0" encoding="utf-8"?>
@@ -23593,27 +23866,15 @@
 </file>
 
 <file path=customXml/item3.xml><?xml version="1.0" encoding="utf-8"?>
-<?mso-contentType ?>
-<FormTemplates xmlns="http://schemas.microsoft.com/sharepoint/v3/contenttype/forms">
-  <Display>DocumentLibraryForm</Display>
-  <Edit>DocumentLibraryForm</Edit>
-  <New>DocumentLibraryForm</New>
-</FormTemplates>
+<p:properties xmlns:p="http://schemas.microsoft.com/office/2006/metadata/properties" xmlns:xsi="http://www.w3.org/2001/XMLSchema-instance" xmlns:pc="http://schemas.microsoft.com/office/infopath/2007/PartnerControls">
+  <documentManagement/>
+</p:properties>
 </file>
 
 <file path=customXml/itemProps1.xml><?xml version="1.0" encoding="utf-8"?>
-<ds:datastoreItem xmlns:ds="http://schemas.openxmlformats.org/officeDocument/2006/customXml" ds:itemID="{F990F116-B58F-4255-B05B-DA3808E0E5C6}">
+<ds:datastoreItem xmlns:ds="http://schemas.openxmlformats.org/officeDocument/2006/customXml" ds:itemID="{758FDAC0-319D-4A54-8D8E-1D42CB1F8004}">
   <ds:schemaRefs>
-    <ds:schemaRef ds:uri="http://schemas.openxmlformats.org/package/2006/metadata/core-properties"/>
-    <ds:schemaRef ds:uri="fbe6fc69-4d02-4668-9123-515ee4aad3e0"/>
-    <ds:schemaRef ds:uri="http://purl.org/dc/dcmitype/"/>
-    <ds:schemaRef ds:uri="http://schemas.microsoft.com/office/infopath/2007/PartnerControls"/>
-    <ds:schemaRef ds:uri="http://purl.org/dc/elements/1.1/"/>
-    <ds:schemaRef ds:uri="de88cb60-5e31-4205-9158-080adefa4b96"/>
-    <ds:schemaRef ds:uri="http://schemas.microsoft.com/office/2006/metadata/properties"/>
-    <ds:schemaRef ds:uri="http://schemas.microsoft.com/office/2006/documentManagement/types"/>
-    <ds:schemaRef ds:uri="http://www.w3.org/XML/1998/namespace"/>
-    <ds:schemaRef ds:uri="http://purl.org/dc/terms/"/>
+    <ds:schemaRef ds:uri="http://schemas.microsoft.com/sharepoint/v3/contenttype/forms"/>
   </ds:schemaRefs>
 </ds:datastoreItem>
 </file>
@@ -23638,9 +23899,18 @@
 </file>
 
 <file path=customXml/itemProps3.xml><?xml version="1.0" encoding="utf-8"?>
-<ds:datastoreItem xmlns:ds="http://schemas.openxmlformats.org/officeDocument/2006/customXml" ds:itemID="{758FDAC0-319D-4A54-8D8E-1D42CB1F8004}">
+<ds:datastoreItem xmlns:ds="http://schemas.openxmlformats.org/officeDocument/2006/customXml" ds:itemID="{F990F116-B58F-4255-B05B-DA3808E0E5C6}">
   <ds:schemaRefs>
-    <ds:schemaRef ds:uri="http://schemas.microsoft.com/sharepoint/v3/contenttype/forms"/>
+    <ds:schemaRef ds:uri="http://schemas.openxmlformats.org/package/2006/metadata/core-properties"/>
+    <ds:schemaRef ds:uri="fbe6fc69-4d02-4668-9123-515ee4aad3e0"/>
+    <ds:schemaRef ds:uri="http://purl.org/dc/dcmitype/"/>
+    <ds:schemaRef ds:uri="http://schemas.microsoft.com/office/infopath/2007/PartnerControls"/>
+    <ds:schemaRef ds:uri="http://purl.org/dc/elements/1.1/"/>
+    <ds:schemaRef ds:uri="de88cb60-5e31-4205-9158-080adefa4b96"/>
+    <ds:schemaRef ds:uri="http://schemas.microsoft.com/office/2006/metadata/properties"/>
+    <ds:schemaRef ds:uri="http://schemas.microsoft.com/office/2006/documentManagement/types"/>
+    <ds:schemaRef ds:uri="http://www.w3.org/XML/1998/namespace"/>
+    <ds:schemaRef ds:uri="http://purl.org/dc/terms/"/>
   </ds:schemaRefs>
 </ds:datastoreItem>
 </file>
</xml_diff>